<commit_message>
hw03 added, fixed typo in lec03 ppt
</commit_message>
<xml_diff>
--- a/LEC/lec03-data-wrangling-terminal/lec-data-wrangling-terminal.pptx
+++ b/LEC/lec03-data-wrangling-terminal/lec-data-wrangling-terminal.pptx
@@ -133,20 +133,12 @@
 </p:presentation>
 </file>
 
-<file path=ppt/revisionInfo.xml><?xml version="1.0" encoding="utf-8"?>
-<p1510:revInfo xmlns:a="http://schemas.openxmlformats.org/drawingml/2006/main" xmlns:r="http://schemas.openxmlformats.org/officeDocument/2006/relationships" xmlns:p1510="http://schemas.microsoft.com/office/powerpoint/2015/10/main">
-  <p1510:revLst>
-    <p1510:client id="{6243AB4B-FA16-4D90-B6E7-14E4E6947D17}" v="234" dt="2026-01-28T18:42:00.073"/>
-  </p1510:revLst>
-</p1510:revInfo>
-</file>
-
 <file path=ppt/changesInfos/changesInfo1.xml><?xml version="1.0" encoding="utf-8"?>
 <pc:chgInfo xmlns:a="http://schemas.openxmlformats.org/drawingml/2006/main" xmlns:r="http://schemas.openxmlformats.org/officeDocument/2006/relationships" xmlns:ac="http://schemas.microsoft.com/office/drawing/2013/main/command" xmlns:pc="http://schemas.microsoft.com/office/powerpoint/2013/main/command">
   <pc:docChgLst>
     <pc:chgData name="Frommer, Ian Dr. (EDU)" userId="28ca3ff0-544f-450a-928b-99e19cf49b89" providerId="ADAL" clId="{FDDA6EB0-4FD6-4516-ACA5-A4CAC6441DA7}"/>
     <pc:docChg chg="undo custSel addSld delSld modSld sldOrd">
-      <pc:chgData name="Frommer, Ian Dr. (EDU)" userId="28ca3ff0-544f-450a-928b-99e19cf49b89" providerId="ADAL" clId="{FDDA6EB0-4FD6-4516-ACA5-A4CAC6441DA7}" dt="2026-01-28T18:42:52.374" v="7662" actId="2711"/>
+      <pc:chgData name="Frommer, Ian Dr. (EDU)" userId="28ca3ff0-544f-450a-928b-99e19cf49b89" providerId="ADAL" clId="{FDDA6EB0-4FD6-4516-ACA5-A4CAC6441DA7}" dt="2026-01-29T19:43:24.048" v="7663" actId="20577"/>
       <pc:docMkLst>
         <pc:docMk/>
       </pc:docMkLst>
@@ -164,17 +156,9 @@
             <ac:spMk id="2" creationId="{1FFE8F83-6328-56D8-E459-9A149BA99968}"/>
           </ac:spMkLst>
         </pc:spChg>
-        <pc:spChg chg="del">
-          <ac:chgData name="Frommer, Ian Dr. (EDU)" userId="28ca3ff0-544f-450a-928b-99e19cf49b89" providerId="ADAL" clId="{FDDA6EB0-4FD6-4516-ACA5-A4CAC6441DA7}" dt="2026-01-27T01:27:28.141" v="1410" actId="478"/>
-          <ac:spMkLst>
-            <pc:docMk/>
-            <pc:sldMk cId="2724483603" sldId="256"/>
-            <ac:spMk id="3" creationId="{F7480A67-A972-FF81-1B52-FFD3E6A7EAE2}"/>
-          </ac:spMkLst>
-        </pc:spChg>
       </pc:sldChg>
       <pc:sldChg chg="modSp new mod">
-        <pc:chgData name="Frommer, Ian Dr. (EDU)" userId="28ca3ff0-544f-450a-928b-99e19cf49b89" providerId="ADAL" clId="{FDDA6EB0-4FD6-4516-ACA5-A4CAC6441DA7}" dt="2026-01-28T15:56:04.933" v="5223" actId="1076"/>
+        <pc:chgData name="Frommer, Ian Dr. (EDU)" userId="28ca3ff0-544f-450a-928b-99e19cf49b89" providerId="ADAL" clId="{FDDA6EB0-4FD6-4516-ACA5-A4CAC6441DA7}" dt="2026-01-29T19:43:24.048" v="7663" actId="20577"/>
         <pc:sldMkLst>
           <pc:docMk/>
           <pc:sldMk cId="3037661301" sldId="257"/>
@@ -188,7 +172,7 @@
           </ac:spMkLst>
         </pc:spChg>
         <pc:spChg chg="mod">
-          <ac:chgData name="Frommer, Ian Dr. (EDU)" userId="28ca3ff0-544f-450a-928b-99e19cf49b89" providerId="ADAL" clId="{FDDA6EB0-4FD6-4516-ACA5-A4CAC6441DA7}" dt="2026-01-28T15:56:04.933" v="5223" actId="1076"/>
+          <ac:chgData name="Frommer, Ian Dr. (EDU)" userId="28ca3ff0-544f-450a-928b-99e19cf49b89" providerId="ADAL" clId="{FDDA6EB0-4FD6-4516-ACA5-A4CAC6441DA7}" dt="2026-01-29T19:43:24.048" v="7663" actId="20577"/>
           <ac:spMkLst>
             <pc:docMk/>
             <pc:sldMk cId="3037661301" sldId="257"/>
@@ -349,29 +333,6 @@
           </ac:spMkLst>
         </pc:spChg>
       </pc:sldChg>
-      <pc:sldChg chg="modSp new del mod">
-        <pc:chgData name="Frommer, Ian Dr. (EDU)" userId="28ca3ff0-544f-450a-928b-99e19cf49b89" providerId="ADAL" clId="{FDDA6EB0-4FD6-4516-ACA5-A4CAC6441DA7}" dt="2026-01-27T15:32:21.966" v="2188" actId="47"/>
-        <pc:sldMkLst>
-          <pc:docMk/>
-          <pc:sldMk cId="871200897" sldId="265"/>
-        </pc:sldMkLst>
-        <pc:spChg chg="mod">
-          <ac:chgData name="Frommer, Ian Dr. (EDU)" userId="28ca3ff0-544f-450a-928b-99e19cf49b89" providerId="ADAL" clId="{FDDA6EB0-4FD6-4516-ACA5-A4CAC6441DA7}" dt="2026-01-27T01:36:23.365" v="1657" actId="20577"/>
-          <ac:spMkLst>
-            <pc:docMk/>
-            <pc:sldMk cId="871200897" sldId="265"/>
-            <ac:spMk id="2" creationId="{FA33AAC9-A0B1-9B17-1F94-C29F3040308C}"/>
-          </ac:spMkLst>
-        </pc:spChg>
-        <pc:spChg chg="mod">
-          <ac:chgData name="Frommer, Ian Dr. (EDU)" userId="28ca3ff0-544f-450a-928b-99e19cf49b89" providerId="ADAL" clId="{FDDA6EB0-4FD6-4516-ACA5-A4CAC6441DA7}" dt="2026-01-27T13:52:02.290" v="1825" actId="21"/>
-          <ac:spMkLst>
-            <pc:docMk/>
-            <pc:sldMk cId="871200897" sldId="265"/>
-            <ac:spMk id="3" creationId="{41B00972-959D-DB37-5FAE-338B28E2A0F4}"/>
-          </ac:spMkLst>
-        </pc:spChg>
-      </pc:sldChg>
       <pc:sldChg chg="modSp new mod ord">
         <pc:chgData name="Frommer, Ian Dr. (EDU)" userId="28ca3ff0-544f-450a-928b-99e19cf49b89" providerId="ADAL" clId="{FDDA6EB0-4FD6-4516-ACA5-A4CAC6441DA7}" dt="2026-01-28T15:58:13.433" v="5236" actId="113"/>
         <pc:sldMkLst>
@@ -392,52 +353,6 @@
             <pc:docMk/>
             <pc:sldMk cId="522111509" sldId="266"/>
             <ac:spMk id="3" creationId="{940CAFA3-CADA-8078-6A29-FF3C6E551029}"/>
-          </ac:spMkLst>
-        </pc:spChg>
-      </pc:sldChg>
-      <pc:sldChg chg="modSp new del mod">
-        <pc:chgData name="Frommer, Ian Dr. (EDU)" userId="28ca3ff0-544f-450a-928b-99e19cf49b89" providerId="ADAL" clId="{FDDA6EB0-4FD6-4516-ACA5-A4CAC6441DA7}" dt="2026-01-27T15:43:55.312" v="2206" actId="2696"/>
-        <pc:sldMkLst>
-          <pc:docMk/>
-          <pc:sldMk cId="2113928964" sldId="267"/>
-        </pc:sldMkLst>
-        <pc:spChg chg="mod">
-          <ac:chgData name="Frommer, Ian Dr. (EDU)" userId="28ca3ff0-544f-450a-928b-99e19cf49b89" providerId="ADAL" clId="{FDDA6EB0-4FD6-4516-ACA5-A4CAC6441DA7}" dt="2026-01-27T01:30:47.971" v="1526" actId="20577"/>
-          <ac:spMkLst>
-            <pc:docMk/>
-            <pc:sldMk cId="2113928964" sldId="267"/>
-            <ac:spMk id="2" creationId="{AB921BC5-D5E5-D7EB-487A-4275ABD8F3A8}"/>
-          </ac:spMkLst>
-        </pc:spChg>
-        <pc:spChg chg="mod">
-          <ac:chgData name="Frommer, Ian Dr. (EDU)" userId="28ca3ff0-544f-450a-928b-99e19cf49b89" providerId="ADAL" clId="{FDDA6EB0-4FD6-4516-ACA5-A4CAC6441DA7}" dt="2026-01-27T15:43:52.422" v="2205" actId="6549"/>
-          <ac:spMkLst>
-            <pc:docMk/>
-            <pc:sldMk cId="2113928964" sldId="267"/>
-            <ac:spMk id="3" creationId="{5614041A-2196-E7A7-7FD3-FD546FAE1CC2}"/>
-          </ac:spMkLst>
-        </pc:spChg>
-      </pc:sldChg>
-      <pc:sldChg chg="modSp new del mod">
-        <pc:chgData name="Frommer, Ian Dr. (EDU)" userId="28ca3ff0-544f-450a-928b-99e19cf49b89" providerId="ADAL" clId="{FDDA6EB0-4FD6-4516-ACA5-A4CAC6441DA7}" dt="2026-01-27T15:32:28.601" v="2189" actId="47"/>
-        <pc:sldMkLst>
-          <pc:docMk/>
-          <pc:sldMk cId="1758890504" sldId="268"/>
-        </pc:sldMkLst>
-        <pc:spChg chg="mod">
-          <ac:chgData name="Frommer, Ian Dr. (EDU)" userId="28ca3ff0-544f-450a-928b-99e19cf49b89" providerId="ADAL" clId="{FDDA6EB0-4FD6-4516-ACA5-A4CAC6441DA7}" dt="2026-01-27T01:42:30.669" v="1686" actId="20577"/>
-          <ac:spMkLst>
-            <pc:docMk/>
-            <pc:sldMk cId="1758890504" sldId="268"/>
-            <ac:spMk id="2" creationId="{76221006-6B28-2BAD-08B4-FC226E0B5F73}"/>
-          </ac:spMkLst>
-        </pc:spChg>
-        <pc:spChg chg="mod">
-          <ac:chgData name="Frommer, Ian Dr. (EDU)" userId="28ca3ff0-544f-450a-928b-99e19cf49b89" providerId="ADAL" clId="{FDDA6EB0-4FD6-4516-ACA5-A4CAC6441DA7}" dt="2026-01-27T15:32:10.306" v="2185" actId="21"/>
-          <ac:spMkLst>
-            <pc:docMk/>
-            <pc:sldMk cId="1758890504" sldId="268"/>
-            <ac:spMk id="3" creationId="{F3BE8353-DECF-9539-73DD-2E5BD9837A58}"/>
           </ac:spMkLst>
         </pc:spChg>
       </pc:sldChg>
@@ -618,14 +533,6 @@
             <ac:spMk id="13" creationId="{31D24178-A045-A6BB-4278-CBD589DEB3CE}"/>
           </ac:spMkLst>
         </pc:spChg>
-        <pc:graphicFrameChg chg="add mod">
-          <ac:chgData name="Frommer, Ian Dr. (EDU)" userId="28ca3ff0-544f-450a-928b-99e19cf49b89" providerId="ADAL" clId="{FDDA6EB0-4FD6-4516-ACA5-A4CAC6441DA7}" dt="2026-01-27T21:15:32.973" v="3861"/>
-          <ac:graphicFrameMkLst>
-            <pc:docMk/>
-            <pc:sldMk cId="3340701025" sldId="274"/>
-            <ac:graphicFrameMk id="4" creationId="{BA34E70A-6CD1-70A9-E30A-9CD3D1A85803}"/>
-          </ac:graphicFrameMkLst>
-        </pc:graphicFrameChg>
         <pc:graphicFrameChg chg="add mod">
           <ac:chgData name="Frommer, Ian Dr. (EDU)" userId="28ca3ff0-544f-450a-928b-99e19cf49b89" providerId="ADAL" clId="{FDDA6EB0-4FD6-4516-ACA5-A4CAC6441DA7}" dt="2026-01-28T14:07:59.644" v="4498"/>
           <ac:graphicFrameMkLst>
@@ -861,7 +768,7 @@
           <a:p>
             <a:fld id="{53A9C542-DF14-4D36-A372-CE9324CE6683}" type="datetimeFigureOut">
               <a:rPr lang="en-US" smtClean="0"/>
-              <a:t>1/28/2026</a:t>
+              <a:t>1/29/2026</a:t>
             </a:fld>
             <a:endParaRPr lang="en-US"/>
           </a:p>
@@ -1172,6 +1079,90 @@
           <a:bodyPr/>
           <a:lstStyle/>
           <a:p>
+            <a:endParaRPr lang="en-US"/>
+          </a:p>
+        </p:txBody>
+      </p:sp>
+      <p:sp>
+        <p:nvSpPr>
+          <p:cNvPr id="4" name="Slide Number Placeholder 3"/>
+          <p:cNvSpPr>
+            <a:spLocks noGrp="1"/>
+          </p:cNvSpPr>
+          <p:nvPr>
+            <p:ph type="sldNum" sz="quarter" idx="5"/>
+          </p:nvPr>
+        </p:nvSpPr>
+        <p:spPr/>
+        <p:txBody>
+          <a:bodyPr/>
+          <a:lstStyle/>
+          <a:p>
+            <a:fld id="{AB640BF0-5602-458F-94DD-902755450977}" type="slidenum">
+              <a:rPr lang="en-US" smtClean="0"/>
+              <a:t>2</a:t>
+            </a:fld>
+            <a:endParaRPr lang="en-US"/>
+          </a:p>
+        </p:txBody>
+      </p:sp>
+    </p:spTree>
+    <p:extLst>
+      <p:ext uri="{BB962C8B-B14F-4D97-AF65-F5344CB8AC3E}">
+        <p14:creationId xmlns:p14="http://schemas.microsoft.com/office/powerpoint/2010/main" val="1217574034"/>
+      </p:ext>
+    </p:extLst>
+  </p:cSld>
+  <p:clrMapOvr>
+    <a:masterClrMapping/>
+  </p:clrMapOvr>
+</p:notes>
+</file>
+
+<file path=ppt/notesSlides/notesSlide2.xml><?xml version="1.0" encoding="utf-8"?>
+<p:notes xmlns:a="http://schemas.openxmlformats.org/drawingml/2006/main" xmlns:r="http://schemas.openxmlformats.org/officeDocument/2006/relationships" xmlns:p="http://schemas.openxmlformats.org/presentationml/2006/main">
+  <p:cSld>
+    <p:spTree>
+      <p:nvGrpSpPr>
+        <p:cNvPr id="1" name=""/>
+        <p:cNvGrpSpPr/>
+        <p:nvPr/>
+      </p:nvGrpSpPr>
+      <p:grpSpPr>
+        <a:xfrm>
+          <a:off x="0" y="0"/>
+          <a:ext cx="0" cy="0"/>
+          <a:chOff x="0" y="0"/>
+          <a:chExt cx="0" cy="0"/>
+        </a:xfrm>
+      </p:grpSpPr>
+      <p:sp>
+        <p:nvSpPr>
+          <p:cNvPr id="2" name="Slide Image Placeholder 1"/>
+          <p:cNvSpPr>
+            <a:spLocks noGrp="1" noRot="1" noChangeAspect="1"/>
+          </p:cNvSpPr>
+          <p:nvPr>
+            <p:ph type="sldImg"/>
+          </p:nvPr>
+        </p:nvSpPr>
+        <p:spPr/>
+      </p:sp>
+      <p:sp>
+        <p:nvSpPr>
+          <p:cNvPr id="3" name="Notes Placeholder 2"/>
+          <p:cNvSpPr>
+            <a:spLocks noGrp="1"/>
+          </p:cNvSpPr>
+          <p:nvPr>
+            <p:ph type="body" idx="1"/>
+          </p:nvPr>
+        </p:nvSpPr>
+        <p:spPr/>
+        <p:txBody>
+          <a:bodyPr/>
+          <a:lstStyle/>
+          <a:p>
             <a:pPr marL="0" marR="0" lvl="0" indent="0" algn="l" defTabSz="914400" rtl="0" eaLnBrk="1" fontAlgn="auto" latinLnBrk="0" hangingPunct="1">
               <a:lnSpc>
                 <a:spcPct val="100000"/>
@@ -1390,7 +1381,7 @@
           <a:p>
             <a:fld id="{7CA7801A-4884-4281-9EFB-FF45899423BD}" type="datetimeFigureOut">
               <a:rPr lang="en-US" smtClean="0"/>
-              <a:t>1/27/2026</a:t>
+              <a:t>1/29/2026</a:t>
             </a:fld>
             <a:endParaRPr lang="en-US"/>
           </a:p>
@@ -1588,7 +1579,7 @@
           <a:p>
             <a:fld id="{7CA7801A-4884-4281-9EFB-FF45899423BD}" type="datetimeFigureOut">
               <a:rPr lang="en-US" smtClean="0"/>
-              <a:t>1/27/2026</a:t>
+              <a:t>1/29/2026</a:t>
             </a:fld>
             <a:endParaRPr lang="en-US"/>
           </a:p>
@@ -1796,7 +1787,7 @@
           <a:p>
             <a:fld id="{7CA7801A-4884-4281-9EFB-FF45899423BD}" type="datetimeFigureOut">
               <a:rPr lang="en-US" smtClean="0"/>
-              <a:t>1/27/2026</a:t>
+              <a:t>1/29/2026</a:t>
             </a:fld>
             <a:endParaRPr lang="en-US"/>
           </a:p>
@@ -1994,7 +1985,7 @@
           <a:p>
             <a:fld id="{7CA7801A-4884-4281-9EFB-FF45899423BD}" type="datetimeFigureOut">
               <a:rPr lang="en-US" smtClean="0"/>
-              <a:t>1/27/2026</a:t>
+              <a:t>1/29/2026</a:t>
             </a:fld>
             <a:endParaRPr lang="en-US"/>
           </a:p>
@@ -2269,7 +2260,7 @@
           <a:p>
             <a:fld id="{7CA7801A-4884-4281-9EFB-FF45899423BD}" type="datetimeFigureOut">
               <a:rPr lang="en-US" smtClean="0"/>
-              <a:t>1/27/2026</a:t>
+              <a:t>1/29/2026</a:t>
             </a:fld>
             <a:endParaRPr lang="en-US"/>
           </a:p>
@@ -2534,7 +2525,7 @@
           <a:p>
             <a:fld id="{7CA7801A-4884-4281-9EFB-FF45899423BD}" type="datetimeFigureOut">
               <a:rPr lang="en-US" smtClean="0"/>
-              <a:t>1/27/2026</a:t>
+              <a:t>1/29/2026</a:t>
             </a:fld>
             <a:endParaRPr lang="en-US"/>
           </a:p>
@@ -2946,7 +2937,7 @@
           <a:p>
             <a:fld id="{7CA7801A-4884-4281-9EFB-FF45899423BD}" type="datetimeFigureOut">
               <a:rPr lang="en-US" smtClean="0"/>
-              <a:t>1/27/2026</a:t>
+              <a:t>1/29/2026</a:t>
             </a:fld>
             <a:endParaRPr lang="en-US"/>
           </a:p>
@@ -3087,7 +3078,7 @@
           <a:p>
             <a:fld id="{7CA7801A-4884-4281-9EFB-FF45899423BD}" type="datetimeFigureOut">
               <a:rPr lang="en-US" smtClean="0"/>
-              <a:t>1/27/2026</a:t>
+              <a:t>1/29/2026</a:t>
             </a:fld>
             <a:endParaRPr lang="en-US"/>
           </a:p>
@@ -3200,7 +3191,7 @@
           <a:p>
             <a:fld id="{7CA7801A-4884-4281-9EFB-FF45899423BD}" type="datetimeFigureOut">
               <a:rPr lang="en-US" smtClean="0"/>
-              <a:t>1/27/2026</a:t>
+              <a:t>1/29/2026</a:t>
             </a:fld>
             <a:endParaRPr lang="en-US"/>
           </a:p>
@@ -3511,7 +3502,7 @@
           <a:p>
             <a:fld id="{7CA7801A-4884-4281-9EFB-FF45899423BD}" type="datetimeFigureOut">
               <a:rPr lang="en-US" smtClean="0"/>
-              <a:t>1/27/2026</a:t>
+              <a:t>1/29/2026</a:t>
             </a:fld>
             <a:endParaRPr lang="en-US"/>
           </a:p>
@@ -3799,7 +3790,7 @@
           <a:p>
             <a:fld id="{7CA7801A-4884-4281-9EFB-FF45899423BD}" type="datetimeFigureOut">
               <a:rPr lang="en-US" smtClean="0"/>
-              <a:t>1/27/2026</a:t>
+              <a:t>1/29/2026</a:t>
             </a:fld>
             <a:endParaRPr lang="en-US"/>
           </a:p>
@@ -4040,7 +4031,7 @@
           <a:p>
             <a:fld id="{7CA7801A-4884-4281-9EFB-FF45899423BD}" type="datetimeFigureOut">
               <a:rPr lang="en-US" smtClean="0"/>
-              <a:t>1/27/2026</a:t>
+              <a:t>1/29/2026</a:t>
             </a:fld>
             <a:endParaRPr lang="en-US"/>
           </a:p>
@@ -7460,7 +7451,7 @@
             </a:r>
             <a:r>
               <a:rPr lang="en-US"/>
-              <a:t> (including regex (what the re in grep stands for)</a:t>
+              <a:t> (including regex (what the re in grep stands for))</a:t>
             </a:r>
           </a:p>
           <a:p>

</xml_diff>